<commit_message>
i forgot to commit last night but these are basically all the graphs that i updated
</commit_message>
<xml_diff>
--- a/output/24.3.pptx
+++ b/output/24.3.pptx
@@ -5,7 +5,7 @@
     <p:sldMasterId id="2147483648" r:id="rId1"/>
   </p:sldMasterIdLst>
   <p:notesMasterIdLst>
-    <p:notesMasterId r:id="rId41"/>
+    <p:notesMasterId r:id="rId42"/>
   </p:notesMasterIdLst>
   <p:sldIdLst>
     <p:sldId id="259" r:id="rId2"/>
@@ -30,23 +30,24 @@
     <p:sldId id="311" r:id="rId21"/>
     <p:sldId id="312" r:id="rId22"/>
     <p:sldId id="315" r:id="rId23"/>
-    <p:sldId id="281" r:id="rId24"/>
-    <p:sldId id="282" r:id="rId25"/>
-    <p:sldId id="284" r:id="rId26"/>
-    <p:sldId id="286" r:id="rId27"/>
-    <p:sldId id="288" r:id="rId28"/>
-    <p:sldId id="290" r:id="rId29"/>
-    <p:sldId id="295" r:id="rId30"/>
-    <p:sldId id="292" r:id="rId31"/>
-    <p:sldId id="296" r:id="rId32"/>
-    <p:sldId id="316" r:id="rId33"/>
-    <p:sldId id="317" r:id="rId34"/>
-    <p:sldId id="318" r:id="rId35"/>
-    <p:sldId id="319" r:id="rId36"/>
-    <p:sldId id="320" r:id="rId37"/>
-    <p:sldId id="321" r:id="rId38"/>
-    <p:sldId id="322" r:id="rId39"/>
-    <p:sldId id="323" r:id="rId40"/>
+    <p:sldId id="324" r:id="rId24"/>
+    <p:sldId id="281" r:id="rId25"/>
+    <p:sldId id="282" r:id="rId26"/>
+    <p:sldId id="284" r:id="rId27"/>
+    <p:sldId id="286" r:id="rId28"/>
+    <p:sldId id="288" r:id="rId29"/>
+    <p:sldId id="290" r:id="rId30"/>
+    <p:sldId id="295" r:id="rId31"/>
+    <p:sldId id="292" r:id="rId32"/>
+    <p:sldId id="296" r:id="rId33"/>
+    <p:sldId id="316" r:id="rId34"/>
+    <p:sldId id="317" r:id="rId35"/>
+    <p:sldId id="318" r:id="rId36"/>
+    <p:sldId id="319" r:id="rId37"/>
+    <p:sldId id="320" r:id="rId38"/>
+    <p:sldId id="321" r:id="rId39"/>
+    <p:sldId id="322" r:id="rId40"/>
+    <p:sldId id="323" r:id="rId41"/>
   </p:sldIdLst>
   <p:sldSz cx="12192000" cy="6858000"/>
   <p:notesSz cx="6858000" cy="9144000"/>
@@ -12408,12 +12409,28 @@
             <p:ph idx="1"/>
           </p:nvPr>
         </p:nvSpPr>
-        <p:spPr/>
+        <p:spPr>
+          <a:xfrm>
+            <a:off x="838200" y="6039139"/>
+            <a:ext cx="10515600" cy="661066"/>
+          </a:xfrm>
+        </p:spPr>
         <p:txBody>
-          <a:bodyPr/>
+          <a:bodyPr>
+            <a:normAutofit fontScale="62500" lnSpcReduction="20000"/>
+          </a:bodyPr>
           <a:lstStyle/>
           <a:p>
-            <a:endParaRPr lang="en-GB" dirty="0"/>
+            <a:r>
+              <a:rPr lang="en-GB" dirty="0"/>
+              <a:t>Keep 1, 3, 4,5 7a, 8a, 9a </a:t>
+            </a:r>
+          </a:p>
+          <a:p>
+            <a:r>
+              <a:rPr lang="en-GB" dirty="0"/>
+              <a:t>Report AIC, R2, estimate + std error + significance  </a:t>
+            </a:r>
           </a:p>
         </p:txBody>
       </p:sp>
@@ -12432,13 +12449,13 @@
           <p:nvPr>
             <p:extLst>
               <p:ext uri="{D42A27DB-BD31-4B8C-83A1-F6EECF244321}">
-                <p14:modId xmlns:p14="http://schemas.microsoft.com/office/powerpoint/2010/main" val="666300522"/>
+                <p14:modId xmlns:p14="http://schemas.microsoft.com/office/powerpoint/2010/main" val="441650114"/>
               </p:ext>
             </p:extLst>
           </p:nvPr>
         </p:nvGraphicFramePr>
         <p:xfrm>
-          <a:off x="106681" y="134476"/>
+          <a:off x="141831" y="34592"/>
           <a:ext cx="11908337" cy="6004547"/>
         </p:xfrm>
         <a:graphic>
@@ -19170,6 +19187,114 @@
           <p:cNvPr id="2" name="Title 1">
             <a:extLst>
               <a:ext uri="{FF2B5EF4-FFF2-40B4-BE49-F238E27FC236}">
+                <a16:creationId xmlns:a16="http://schemas.microsoft.com/office/drawing/2014/main" id="{72F4D8AB-9D2A-4F3B-27BF-312A50978811}"/>
+              </a:ext>
+            </a:extLst>
+          </p:cNvPr>
+          <p:cNvSpPr>
+            <a:spLocks noGrp="1"/>
+          </p:cNvSpPr>
+          <p:nvPr>
+            <p:ph type="title"/>
+          </p:nvPr>
+        </p:nvSpPr>
+        <p:spPr/>
+        <p:txBody>
+          <a:bodyPr/>
+          <a:lstStyle/>
+          <a:p>
+            <a:endParaRPr lang="en-GB"/>
+          </a:p>
+        </p:txBody>
+      </p:sp>
+      <p:sp>
+        <p:nvSpPr>
+          <p:cNvPr id="3" name="Content Placeholder 2">
+            <a:extLst>
+              <a:ext uri="{FF2B5EF4-FFF2-40B4-BE49-F238E27FC236}">
+                <a16:creationId xmlns:a16="http://schemas.microsoft.com/office/drawing/2014/main" id="{A19ECB9C-504E-9B53-FE43-DBBC48090F71}"/>
+              </a:ext>
+            </a:extLst>
+          </p:cNvPr>
+          <p:cNvSpPr>
+            <a:spLocks noGrp="1"/>
+          </p:cNvSpPr>
+          <p:nvPr>
+            <p:ph idx="1"/>
+          </p:nvPr>
+        </p:nvSpPr>
+        <p:spPr/>
+        <p:txBody>
+          <a:bodyPr/>
+          <a:lstStyle/>
+          <a:p>
+            <a:r>
+              <a:rPr lang="en-GB" dirty="0"/>
+              <a:t>PCA? </a:t>
+            </a:r>
+            <a:r>
+              <a:rPr lang="en-GB" dirty="0" err="1"/>
+              <a:t>Nvm</a:t>
+            </a:r>
+            <a:r>
+              <a:rPr lang="en-GB" dirty="0"/>
+              <a:t> </a:t>
+            </a:r>
+          </a:p>
+          <a:p>
+            <a:r>
+              <a:rPr lang="en-GB" dirty="0" err="1"/>
+              <a:t>Nmds</a:t>
+            </a:r>
+            <a:r>
+              <a:rPr lang="en-GB" dirty="0"/>
+              <a:t> – visualisation – plotting </a:t>
+            </a:r>
+          </a:p>
+          <a:p>
+            <a:pPr lvl="1"/>
+            <a:r>
+              <a:rPr lang="en-GB" dirty="0"/>
+              <a:t>Seasons and communities only </a:t>
+            </a:r>
+          </a:p>
+        </p:txBody>
+      </p:sp>
+    </p:spTree>
+    <p:extLst>
+      <p:ext uri="{BB962C8B-B14F-4D97-AF65-F5344CB8AC3E}">
+        <p14:creationId xmlns:p14="http://schemas.microsoft.com/office/powerpoint/2010/main" val="1934858189"/>
+      </p:ext>
+    </p:extLst>
+  </p:cSld>
+  <p:clrMapOvr>
+    <a:masterClrMapping/>
+  </p:clrMapOvr>
+</p:sld>
+</file>
+
+<file path=ppt/slides/slide24.xml><?xml version="1.0" encoding="utf-8"?>
+<p:sld xmlns:a="http://schemas.openxmlformats.org/drawingml/2006/main" xmlns:r="http://schemas.openxmlformats.org/officeDocument/2006/relationships" xmlns:p="http://schemas.openxmlformats.org/presentationml/2006/main">
+  <p:cSld>
+    <p:spTree>
+      <p:nvGrpSpPr>
+        <p:cNvPr id="1" name=""/>
+        <p:cNvGrpSpPr/>
+        <p:nvPr/>
+      </p:nvGrpSpPr>
+      <p:grpSpPr>
+        <a:xfrm>
+          <a:off x="0" y="0"/>
+          <a:ext cx="0" cy="0"/>
+          <a:chOff x="0" y="0"/>
+          <a:chExt cx="0" cy="0"/>
+        </a:xfrm>
+      </p:grpSpPr>
+      <p:sp>
+        <p:nvSpPr>
+          <p:cNvPr id="2" name="Title 1">
+            <a:extLst>
+              <a:ext uri="{FF2B5EF4-FFF2-40B4-BE49-F238E27FC236}">
                 <a16:creationId xmlns:a16="http://schemas.microsoft.com/office/drawing/2014/main" id="{C377F028-067A-2EE3-8260-9EF4496F09DA}"/>
               </a:ext>
             </a:extLst>
@@ -19211,7 +19336,9 @@
         </p:nvSpPr>
         <p:spPr/>
         <p:txBody>
-          <a:bodyPr/>
+          <a:bodyPr>
+            <a:normAutofit fontScale="92500"/>
+          </a:bodyPr>
           <a:lstStyle/>
           <a:p>
             <a:pPr>
@@ -19239,6 +19366,26 @@
             <a:r>
               <a:rPr lang="en-GB" dirty="0"/>
               <a:t> a bit confused</a:t>
+            </a:r>
+          </a:p>
+          <a:p>
+            <a:pPr lvl="1">
+              <a:buFontTx/>
+              <a:buChar char="-"/>
+            </a:pPr>
+            <a:r>
+              <a:rPr lang="en-GB" dirty="0"/>
+              <a:t>Tukey HSD </a:t>
+            </a:r>
+          </a:p>
+          <a:p>
+            <a:pPr lvl="1">
+              <a:buFontTx/>
+              <a:buChar char="-"/>
+            </a:pPr>
+            <a:r>
+              <a:rPr lang="en-GB" dirty="0"/>
+              <a:t>A, b, c according to which are the same group</a:t>
             </a:r>
           </a:p>
           <a:p>
@@ -19282,6 +19429,40 @@
               <a:buFontTx/>
               <a:buChar char="-"/>
             </a:pPr>
+            <a:r>
+              <a:rPr lang="en-GB" dirty="0" err="1"/>
+              <a:t>Bquote</a:t>
+            </a:r>
+            <a:r>
+              <a:rPr lang="en-GB" dirty="0"/>
+              <a:t> – superscript </a:t>
+            </a:r>
+          </a:p>
+          <a:p>
+            <a:pPr>
+              <a:buFontTx/>
+              <a:buChar char="-"/>
+            </a:pPr>
+            <a:r>
+              <a:rPr lang="en-GB" dirty="0"/>
+              <a:t>Try to remove the boxes </a:t>
+            </a:r>
+          </a:p>
+          <a:p>
+            <a:pPr>
+              <a:buFontTx/>
+              <a:buChar char="-"/>
+            </a:pPr>
+            <a:r>
+              <a:rPr lang="en-GB" dirty="0"/>
+              <a:t>Colour blind </a:t>
+            </a:r>
+          </a:p>
+          <a:p>
+            <a:pPr>
+              <a:buFontTx/>
+              <a:buChar char="-"/>
+            </a:pPr>
             <a:endParaRPr lang="en-GB" dirty="0"/>
           </a:p>
         </p:txBody>
@@ -19299,7 +19480,7 @@
 </p:sld>
 </file>
 
-<file path=ppt/slides/slide24.xml><?xml version="1.0" encoding="utf-8"?>
+<file path=ppt/slides/slide25.xml><?xml version="1.0" encoding="utf-8"?>
 <p:sld xmlns:a="http://schemas.openxmlformats.org/drawingml/2006/main" xmlns:r="http://schemas.openxmlformats.org/officeDocument/2006/relationships" xmlns:p="http://schemas.openxmlformats.org/presentationml/2006/main">
   <p:cSld>
     <p:spTree>
@@ -19365,7 +19546,7 @@
 </p:sld>
 </file>
 
-<file path=ppt/slides/slide25.xml><?xml version="1.0" encoding="utf-8"?>
+<file path=ppt/slides/slide26.xml><?xml version="1.0" encoding="utf-8"?>
 <p:sld xmlns:a="http://schemas.openxmlformats.org/drawingml/2006/main" xmlns:r="http://schemas.openxmlformats.org/officeDocument/2006/relationships" xmlns:p="http://schemas.openxmlformats.org/presentationml/2006/main">
   <p:cSld>
     <p:spTree>
@@ -19475,7 +19656,7 @@
 </p:sld>
 </file>
 
-<file path=ppt/slides/slide26.xml><?xml version="1.0" encoding="utf-8"?>
+<file path=ppt/slides/slide27.xml><?xml version="1.0" encoding="utf-8"?>
 <p:sld xmlns:a="http://schemas.openxmlformats.org/drawingml/2006/main" xmlns:r="http://schemas.openxmlformats.org/officeDocument/2006/relationships" xmlns:p="http://schemas.openxmlformats.org/presentationml/2006/main">
   <p:cSld>
     <p:spTree>
@@ -19585,7 +19766,7 @@
 </p:sld>
 </file>
 
-<file path=ppt/slides/slide27.xml><?xml version="1.0" encoding="utf-8"?>
+<file path=ppt/slides/slide28.xml><?xml version="1.0" encoding="utf-8"?>
 <p:sld xmlns:a="http://schemas.openxmlformats.org/drawingml/2006/main" xmlns:r="http://schemas.openxmlformats.org/officeDocument/2006/relationships" xmlns:p="http://schemas.openxmlformats.org/presentationml/2006/main">
   <p:cSld>
     <p:spTree>
@@ -19695,7 +19876,7 @@
 </p:sld>
 </file>
 
-<file path=ppt/slides/slide28.xml><?xml version="1.0" encoding="utf-8"?>
+<file path=ppt/slides/slide29.xml><?xml version="1.0" encoding="utf-8"?>
 <p:sld xmlns:a="http://schemas.openxmlformats.org/drawingml/2006/main" xmlns:r="http://schemas.openxmlformats.org/officeDocument/2006/relationships" xmlns:p="http://schemas.openxmlformats.org/presentationml/2006/main">
   <p:cSld>
     <p:spTree>
@@ -19796,101 +19977,6 @@
     <p:extLst>
       <p:ext uri="{BB962C8B-B14F-4D97-AF65-F5344CB8AC3E}">
         <p14:creationId xmlns:p14="http://schemas.microsoft.com/office/powerpoint/2010/main" val="1404879493"/>
-      </p:ext>
-    </p:extLst>
-  </p:cSld>
-  <p:clrMapOvr>
-    <a:masterClrMapping/>
-  </p:clrMapOvr>
-</p:sld>
-</file>
-
-<file path=ppt/slides/slide29.xml><?xml version="1.0" encoding="utf-8"?>
-<p:sld xmlns:a="http://schemas.openxmlformats.org/drawingml/2006/main" xmlns:r="http://schemas.openxmlformats.org/officeDocument/2006/relationships" xmlns:p="http://schemas.openxmlformats.org/presentationml/2006/main">
-  <p:cSld>
-    <p:spTree>
-      <p:nvGrpSpPr>
-        <p:cNvPr id="1" name=""/>
-        <p:cNvGrpSpPr/>
-        <p:nvPr/>
-      </p:nvGrpSpPr>
-      <p:grpSpPr>
-        <a:xfrm>
-          <a:off x="0" y="0"/>
-          <a:ext cx="0" cy="0"/>
-          <a:chOff x="0" y="0"/>
-          <a:chExt cx="0" cy="0"/>
-        </a:xfrm>
-      </p:grpSpPr>
-      <p:sp>
-        <p:nvSpPr>
-          <p:cNvPr id="2" name="Title 1">
-            <a:extLst>
-              <a:ext uri="{FF2B5EF4-FFF2-40B4-BE49-F238E27FC236}">
-                <a16:creationId xmlns:a16="http://schemas.microsoft.com/office/drawing/2014/main" id="{7B679335-7CD6-DA78-5D81-A59D9BB7E2EF}"/>
-              </a:ext>
-            </a:extLst>
-          </p:cNvPr>
-          <p:cNvSpPr>
-            <a:spLocks noGrp="1"/>
-          </p:cNvSpPr>
-          <p:nvPr>
-            <p:ph type="title"/>
-          </p:nvPr>
-        </p:nvSpPr>
-        <p:spPr/>
-        <p:txBody>
-          <a:bodyPr/>
-          <a:lstStyle/>
-          <a:p>
-            <a:r>
-              <a:rPr lang="en-GB" dirty="0"/>
-              <a:t>Seasonal Daphnia Trends</a:t>
-            </a:r>
-          </a:p>
-        </p:txBody>
-      </p:sp>
-      <p:sp>
-        <p:nvSpPr>
-          <p:cNvPr id="3" name="Content Placeholder 2">
-            <a:extLst>
-              <a:ext uri="{FF2B5EF4-FFF2-40B4-BE49-F238E27FC236}">
-                <a16:creationId xmlns:a16="http://schemas.microsoft.com/office/drawing/2014/main" id="{0F9D5721-0DF4-134D-AD4F-715BE76F5835}"/>
-              </a:ext>
-            </a:extLst>
-          </p:cNvPr>
-          <p:cNvSpPr>
-            <a:spLocks noGrp="1"/>
-          </p:cNvSpPr>
-          <p:nvPr>
-            <p:ph idx="1"/>
-          </p:nvPr>
-        </p:nvSpPr>
-        <p:spPr/>
-        <p:txBody>
-          <a:bodyPr/>
-          <a:lstStyle/>
-          <a:p>
-            <a:r>
-              <a:rPr lang="en-GB" dirty="0"/>
-              <a:t>Question about Logging the y-axis – I just cant do it LOL </a:t>
-            </a:r>
-          </a:p>
-          <a:p>
-            <a:r>
-              <a:rPr lang="en-GB" dirty="0"/>
-              <a:t>Question about the 1:1 line – because the difference in range of values is so high – do I log the value?</a:t>
-            </a:r>
-          </a:p>
-          <a:p>
-            <a:endParaRPr lang="en-GB" dirty="0"/>
-          </a:p>
-        </p:txBody>
-      </p:sp>
-    </p:spTree>
-    <p:extLst>
-      <p:ext uri="{BB962C8B-B14F-4D97-AF65-F5344CB8AC3E}">
-        <p14:creationId xmlns:p14="http://schemas.microsoft.com/office/powerpoint/2010/main" val="1422982540"/>
       </p:ext>
     </p:extLst>
   </p:cSld>
@@ -25022,6 +25108,124 @@
           <p:cNvPr id="2" name="Title 1">
             <a:extLst>
               <a:ext uri="{FF2B5EF4-FFF2-40B4-BE49-F238E27FC236}">
+                <a16:creationId xmlns:a16="http://schemas.microsoft.com/office/drawing/2014/main" id="{7B679335-7CD6-DA78-5D81-A59D9BB7E2EF}"/>
+              </a:ext>
+            </a:extLst>
+          </p:cNvPr>
+          <p:cNvSpPr>
+            <a:spLocks noGrp="1"/>
+          </p:cNvSpPr>
+          <p:nvPr>
+            <p:ph type="title"/>
+          </p:nvPr>
+        </p:nvSpPr>
+        <p:spPr/>
+        <p:txBody>
+          <a:bodyPr/>
+          <a:lstStyle/>
+          <a:p>
+            <a:r>
+              <a:rPr lang="en-GB" dirty="0"/>
+              <a:t>Seasonal Daphnia Trends</a:t>
+            </a:r>
+          </a:p>
+        </p:txBody>
+      </p:sp>
+      <p:sp>
+        <p:nvSpPr>
+          <p:cNvPr id="3" name="Content Placeholder 2">
+            <a:extLst>
+              <a:ext uri="{FF2B5EF4-FFF2-40B4-BE49-F238E27FC236}">
+                <a16:creationId xmlns:a16="http://schemas.microsoft.com/office/drawing/2014/main" id="{0F9D5721-0DF4-134D-AD4F-715BE76F5835}"/>
+              </a:ext>
+            </a:extLst>
+          </p:cNvPr>
+          <p:cNvSpPr>
+            <a:spLocks noGrp="1"/>
+          </p:cNvSpPr>
+          <p:nvPr>
+            <p:ph idx="1"/>
+          </p:nvPr>
+        </p:nvSpPr>
+        <p:spPr/>
+        <p:txBody>
+          <a:bodyPr/>
+          <a:lstStyle/>
+          <a:p>
+            <a:r>
+              <a:rPr lang="en-GB" dirty="0"/>
+              <a:t>Question about Logging the y-axis – I just cant do it LOL </a:t>
+            </a:r>
+          </a:p>
+          <a:p>
+            <a:r>
+              <a:rPr lang="en-GB" dirty="0"/>
+              <a:t>Question about the 1:1 line – scale the gradient to the range </a:t>
+            </a:r>
+          </a:p>
+          <a:p>
+            <a:r>
+              <a:rPr lang="en-GB" dirty="0"/>
+              <a:t>Try to e to x10</a:t>
+            </a:r>
+            <a:r>
+              <a:rPr lang="en-GB" baseline="30000" dirty="0"/>
+              <a:t>x</a:t>
+            </a:r>
+            <a:endParaRPr lang="en-GB" dirty="0"/>
+          </a:p>
+          <a:p>
+            <a:r>
+              <a:rPr lang="en-GB" dirty="0"/>
+              <a:t>Remove the middle y axis</a:t>
+            </a:r>
+          </a:p>
+          <a:p>
+            <a:r>
+              <a:rPr lang="en-GB" dirty="0"/>
+              <a:t>Copy and paste the legends </a:t>
+            </a:r>
+          </a:p>
+          <a:p>
+            <a:endParaRPr lang="en-GB" dirty="0"/>
+          </a:p>
+        </p:txBody>
+      </p:sp>
+    </p:spTree>
+    <p:extLst>
+      <p:ext uri="{BB962C8B-B14F-4D97-AF65-F5344CB8AC3E}">
+        <p14:creationId xmlns:p14="http://schemas.microsoft.com/office/powerpoint/2010/main" val="1422982540"/>
+      </p:ext>
+    </p:extLst>
+  </p:cSld>
+  <p:clrMapOvr>
+    <a:masterClrMapping/>
+  </p:clrMapOvr>
+</p:sld>
+</file>
+
+<file path=ppt/slides/slide31.xml><?xml version="1.0" encoding="utf-8"?>
+<p:sld xmlns:a="http://schemas.openxmlformats.org/drawingml/2006/main" xmlns:r="http://schemas.openxmlformats.org/officeDocument/2006/relationships" xmlns:p="http://schemas.openxmlformats.org/presentationml/2006/main">
+  <p:cSld>
+    <p:spTree>
+      <p:nvGrpSpPr>
+        <p:cNvPr id="1" name=""/>
+        <p:cNvGrpSpPr/>
+        <p:nvPr/>
+      </p:nvGrpSpPr>
+      <p:grpSpPr>
+        <a:xfrm>
+          <a:off x="0" y="0"/>
+          <a:ext cx="0" cy="0"/>
+          <a:chOff x="0" y="0"/>
+          <a:chExt cx="0" cy="0"/>
+        </a:xfrm>
+      </p:grpSpPr>
+      <p:sp>
+        <p:nvSpPr>
+          <p:cNvPr id="2" name="Title 1">
+            <a:extLst>
+              <a:ext uri="{FF2B5EF4-FFF2-40B4-BE49-F238E27FC236}">
                 <a16:creationId xmlns:a16="http://schemas.microsoft.com/office/drawing/2014/main" id="{F97812AD-DAAF-1099-2AAE-899FFD0B0202}"/>
               </a:ext>
             </a:extLst>
@@ -25090,7 +25294,7 @@
 </p:sld>
 </file>
 
-<file path=ppt/slides/slide31.xml><?xml version="1.0" encoding="utf-8"?>
+<file path=ppt/slides/slide32.xml><?xml version="1.0" encoding="utf-8"?>
 <p:sld xmlns:a="http://schemas.openxmlformats.org/drawingml/2006/main" xmlns:r="http://schemas.openxmlformats.org/officeDocument/2006/relationships" xmlns:p="http://schemas.openxmlformats.org/presentationml/2006/main">
   <p:cSld>
     <p:spTree>
@@ -25180,7 +25384,7 @@
 </p:sld>
 </file>
 
-<file path=ppt/slides/slide32.xml><?xml version="1.0" encoding="utf-8"?>
+<file path=ppt/slides/slide33.xml><?xml version="1.0" encoding="utf-8"?>
 <p:sld xmlns:a="http://schemas.openxmlformats.org/drawingml/2006/main" xmlns:r="http://schemas.openxmlformats.org/officeDocument/2006/relationships" xmlns:p="http://schemas.openxmlformats.org/presentationml/2006/main">
   <p:cSld>
     <p:spTree>
@@ -25263,7 +25467,7 @@
 </p:sld>
 </file>
 
-<file path=ppt/slides/slide33.xml><?xml version="1.0" encoding="utf-8"?>
+<file path=ppt/slides/slide34.xml><?xml version="1.0" encoding="utf-8"?>
 <p:sld xmlns:a="http://schemas.openxmlformats.org/drawingml/2006/main" xmlns:r="http://schemas.openxmlformats.org/officeDocument/2006/relationships" xmlns:p="http://schemas.openxmlformats.org/presentationml/2006/main">
   <p:cSld>
     <p:spTree>
@@ -25533,7 +25737,7 @@
 </p:sld>
 </file>
 
-<file path=ppt/slides/slide34.xml><?xml version="1.0" encoding="utf-8"?>
+<file path=ppt/slides/slide35.xml><?xml version="1.0" encoding="utf-8"?>
 <p:sld xmlns:a="http://schemas.openxmlformats.org/drawingml/2006/main" xmlns:r="http://schemas.openxmlformats.org/officeDocument/2006/relationships" xmlns:p="http://schemas.openxmlformats.org/presentationml/2006/main">
   <p:cSld>
     <p:spTree>
@@ -25677,7 +25881,7 @@
 </p:sld>
 </file>
 
-<file path=ppt/slides/slide35.xml><?xml version="1.0" encoding="utf-8"?>
+<file path=ppt/slides/slide36.xml><?xml version="1.0" encoding="utf-8"?>
 <p:sld xmlns:a="http://schemas.openxmlformats.org/drawingml/2006/main" xmlns:r="http://schemas.openxmlformats.org/officeDocument/2006/relationships" xmlns:p="http://schemas.openxmlformats.org/presentationml/2006/main">
   <p:cSld>
     <p:spTree>
@@ -25787,7 +25991,7 @@
 </p:sld>
 </file>
 
-<file path=ppt/slides/slide36.xml><?xml version="1.0" encoding="utf-8"?>
+<file path=ppt/slides/slide37.xml><?xml version="1.0" encoding="utf-8"?>
 <p:sld xmlns:a="http://schemas.openxmlformats.org/drawingml/2006/main" xmlns:r="http://schemas.openxmlformats.org/officeDocument/2006/relationships" xmlns:p="http://schemas.openxmlformats.org/presentationml/2006/main">
   <p:cSld>
     <p:spTree>
@@ -25898,6 +26102,60 @@
           </a:prstGeom>
         </p:spPr>
       </p:pic>
+      <p:sp>
+        <p:nvSpPr>
+          <p:cNvPr id="14" name="Title 1">
+            <a:extLst>
+              <a:ext uri="{FF2B5EF4-FFF2-40B4-BE49-F238E27FC236}">
+                <a16:creationId xmlns:a16="http://schemas.microsoft.com/office/drawing/2014/main" id="{A6C7B3B4-84B3-6942-7CD5-7231A836E2CF}"/>
+              </a:ext>
+            </a:extLst>
+          </p:cNvPr>
+          <p:cNvSpPr txBox="1">
+            <a:spLocks/>
+          </p:cNvSpPr>
+          <p:nvPr/>
+        </p:nvSpPr>
+        <p:spPr>
+          <a:xfrm>
+            <a:off x="838200" y="2799735"/>
+            <a:ext cx="8197645" cy="629265"/>
+          </a:xfrm>
+          <a:prstGeom prst="rect">
+            <a:avLst/>
+          </a:prstGeom>
+        </p:spPr>
+        <p:txBody>
+          <a:bodyPr vert="horz" lIns="91440" tIns="45720" rIns="91440" bIns="45720" rtlCol="0" anchor="ctr">
+            <a:normAutofit fontScale="97500"/>
+          </a:bodyPr>
+          <a:lstStyle>
+            <a:lvl1pPr algn="l" defTabSz="914400" rtl="0" eaLnBrk="1" latinLnBrk="0" hangingPunct="1">
+              <a:lnSpc>
+                <a:spcPct val="90000"/>
+              </a:lnSpc>
+              <a:spcBef>
+                <a:spcPct val="0"/>
+              </a:spcBef>
+              <a:buNone/>
+              <a:defRPr sz="4400" kern="1200">
+                <a:solidFill>
+                  <a:schemeClr val="tx1"/>
+                </a:solidFill>
+                <a:latin typeface="+mj-lt"/>
+                <a:ea typeface="+mj-ea"/>
+                <a:cs typeface="+mj-cs"/>
+              </a:defRPr>
+            </a:lvl1pPr>
+          </a:lstStyle>
+          <a:p>
+            <a:r>
+              <a:rPr lang="en-GB" sz="2400" dirty="0"/>
+              <a:t>R2 - Pearsons row </a:t>
+            </a:r>
+          </a:p>
+        </p:txBody>
+      </p:sp>
     </p:spTree>
     <p:extLst>
       <p:ext uri="{BB962C8B-B14F-4D97-AF65-F5344CB8AC3E}">
@@ -25911,7 +26169,7 @@
 </p:sld>
 </file>
 
-<file path=ppt/slides/slide37.xml><?xml version="1.0" encoding="utf-8"?>
+<file path=ppt/slides/slide38.xml><?xml version="1.0" encoding="utf-8"?>
 <p:sld xmlns:a="http://schemas.openxmlformats.org/drawingml/2006/main" xmlns:r="http://schemas.openxmlformats.org/officeDocument/2006/relationships" xmlns:p="http://schemas.openxmlformats.org/presentationml/2006/main">
   <p:cSld>
     <p:spTree>
@@ -26055,7 +26313,7 @@
 </p:sld>
 </file>
 
-<file path=ppt/slides/slide38.xml><?xml version="1.0" encoding="utf-8"?>
+<file path=ppt/slides/slide39.xml><?xml version="1.0" encoding="utf-8"?>
 <p:sld xmlns:a="http://schemas.openxmlformats.org/drawingml/2006/main" xmlns:r="http://schemas.openxmlformats.org/officeDocument/2006/relationships" xmlns:p="http://schemas.openxmlformats.org/presentationml/2006/main">
   <p:cSld>
     <p:spTree>
@@ -26253,146 +26511,6 @@
 </p:sld>
 </file>
 
-<file path=ppt/slides/slide39.xml><?xml version="1.0" encoding="utf-8"?>
-<p:sld xmlns:a="http://schemas.openxmlformats.org/drawingml/2006/main" xmlns:r="http://schemas.openxmlformats.org/officeDocument/2006/relationships" xmlns:p="http://schemas.openxmlformats.org/presentationml/2006/main">
-  <p:cSld>
-    <p:spTree>
-      <p:nvGrpSpPr>
-        <p:cNvPr id="1" name=""/>
-        <p:cNvGrpSpPr/>
-        <p:nvPr/>
-      </p:nvGrpSpPr>
-      <p:grpSpPr>
-        <a:xfrm>
-          <a:off x="0" y="0"/>
-          <a:ext cx="0" cy="0"/>
-          <a:chOff x="0" y="0"/>
-          <a:chExt cx="0" cy="0"/>
-        </a:xfrm>
-      </p:grpSpPr>
-      <p:sp>
-        <p:nvSpPr>
-          <p:cNvPr id="2" name="Title 1">
-            <a:extLst>
-              <a:ext uri="{FF2B5EF4-FFF2-40B4-BE49-F238E27FC236}">
-                <a16:creationId xmlns:a16="http://schemas.microsoft.com/office/drawing/2014/main" id="{AAD12D3A-A4C0-ED74-B29F-DB6B7447D439}"/>
-              </a:ext>
-            </a:extLst>
-          </p:cNvPr>
-          <p:cNvSpPr>
-            <a:spLocks noGrp="1"/>
-          </p:cNvSpPr>
-          <p:nvPr>
-            <p:ph type="title"/>
-          </p:nvPr>
-        </p:nvSpPr>
-        <p:spPr/>
-        <p:txBody>
-          <a:bodyPr/>
-          <a:lstStyle/>
-          <a:p>
-            <a:endParaRPr lang="en-GB"/>
-          </a:p>
-        </p:txBody>
-      </p:sp>
-      <p:sp>
-        <p:nvSpPr>
-          <p:cNvPr id="3" name="Content Placeholder 2">
-            <a:extLst>
-              <a:ext uri="{FF2B5EF4-FFF2-40B4-BE49-F238E27FC236}">
-                <a16:creationId xmlns:a16="http://schemas.microsoft.com/office/drawing/2014/main" id="{886CF5DA-A3A4-AF79-E174-46B2329FF548}"/>
-              </a:ext>
-            </a:extLst>
-          </p:cNvPr>
-          <p:cNvSpPr>
-            <a:spLocks noGrp="1"/>
-          </p:cNvSpPr>
-          <p:nvPr>
-            <p:ph idx="1"/>
-          </p:nvPr>
-        </p:nvSpPr>
-        <p:spPr/>
-        <p:txBody>
-          <a:bodyPr/>
-          <a:lstStyle/>
-          <a:p>
-            <a:endParaRPr lang="en-GB"/>
-          </a:p>
-        </p:txBody>
-      </p:sp>
-      <p:pic>
-        <p:nvPicPr>
-          <p:cNvPr id="5" name="Picture 4">
-            <a:extLst>
-              <a:ext uri="{FF2B5EF4-FFF2-40B4-BE49-F238E27FC236}">
-                <a16:creationId xmlns:a16="http://schemas.microsoft.com/office/drawing/2014/main" id="{F8D42A09-FF7F-1114-3FF2-553B70E9C77A}"/>
-              </a:ext>
-            </a:extLst>
-          </p:cNvPr>
-          <p:cNvPicPr>
-            <a:picLocks noChangeAspect="1"/>
-          </p:cNvPicPr>
-          <p:nvPr/>
-        </p:nvPicPr>
-        <p:blipFill>
-          <a:blip r:embed="rId2"/>
-          <a:stretch>
-            <a:fillRect/>
-          </a:stretch>
-        </p:blipFill>
-        <p:spPr>
-          <a:xfrm>
-            <a:off x="0" y="308924"/>
-            <a:ext cx="12192000" cy="6240151"/>
-          </a:xfrm>
-          <a:prstGeom prst="rect">
-            <a:avLst/>
-          </a:prstGeom>
-        </p:spPr>
-      </p:pic>
-      <p:pic>
-        <p:nvPicPr>
-          <p:cNvPr id="10" name="Picture 9">
-            <a:extLst>
-              <a:ext uri="{FF2B5EF4-FFF2-40B4-BE49-F238E27FC236}">
-                <a16:creationId xmlns:a16="http://schemas.microsoft.com/office/drawing/2014/main" id="{7FF79DD6-D360-D663-209F-59EAE84076ED}"/>
-              </a:ext>
-            </a:extLst>
-          </p:cNvPr>
-          <p:cNvPicPr>
-            <a:picLocks noChangeAspect="1"/>
-          </p:cNvPicPr>
-          <p:nvPr/>
-        </p:nvPicPr>
-        <p:blipFill>
-          <a:blip r:embed="rId3"/>
-          <a:stretch>
-            <a:fillRect/>
-          </a:stretch>
-        </p:blipFill>
-        <p:spPr>
-          <a:xfrm>
-            <a:off x="7698658" y="201481"/>
-            <a:ext cx="4288321" cy="704053"/>
-          </a:xfrm>
-          <a:prstGeom prst="rect">
-            <a:avLst/>
-          </a:prstGeom>
-        </p:spPr>
-      </p:pic>
-    </p:spTree>
-    <p:extLst>
-      <p:ext uri="{BB962C8B-B14F-4D97-AF65-F5344CB8AC3E}">
-        <p14:creationId xmlns:p14="http://schemas.microsoft.com/office/powerpoint/2010/main" val="1939344988"/>
-      </p:ext>
-    </p:extLst>
-  </p:cSld>
-  <p:clrMapOvr>
-    <a:masterClrMapping/>
-  </p:clrMapOvr>
-</p:sld>
-</file>
-
 <file path=ppt/slides/slide4.xml><?xml version="1.0" encoding="utf-8"?>
 <p:sld xmlns:a="http://schemas.openxmlformats.org/drawingml/2006/main" xmlns:r="http://schemas.openxmlformats.org/officeDocument/2006/relationships" xmlns:p="http://schemas.openxmlformats.org/presentationml/2006/main">
   <p:cSld>
@@ -31063,6 +31181,146 @@
     <p:extLst>
       <p:ext uri="{BB962C8B-B14F-4D97-AF65-F5344CB8AC3E}">
         <p14:creationId xmlns:p14="http://schemas.microsoft.com/office/powerpoint/2010/main" val="1817230708"/>
+      </p:ext>
+    </p:extLst>
+  </p:cSld>
+  <p:clrMapOvr>
+    <a:masterClrMapping/>
+  </p:clrMapOvr>
+</p:sld>
+</file>
+
+<file path=ppt/slides/slide40.xml><?xml version="1.0" encoding="utf-8"?>
+<p:sld xmlns:a="http://schemas.openxmlformats.org/drawingml/2006/main" xmlns:r="http://schemas.openxmlformats.org/officeDocument/2006/relationships" xmlns:p="http://schemas.openxmlformats.org/presentationml/2006/main">
+  <p:cSld>
+    <p:spTree>
+      <p:nvGrpSpPr>
+        <p:cNvPr id="1" name=""/>
+        <p:cNvGrpSpPr/>
+        <p:nvPr/>
+      </p:nvGrpSpPr>
+      <p:grpSpPr>
+        <a:xfrm>
+          <a:off x="0" y="0"/>
+          <a:ext cx="0" cy="0"/>
+          <a:chOff x="0" y="0"/>
+          <a:chExt cx="0" cy="0"/>
+        </a:xfrm>
+      </p:grpSpPr>
+      <p:sp>
+        <p:nvSpPr>
+          <p:cNvPr id="2" name="Title 1">
+            <a:extLst>
+              <a:ext uri="{FF2B5EF4-FFF2-40B4-BE49-F238E27FC236}">
+                <a16:creationId xmlns:a16="http://schemas.microsoft.com/office/drawing/2014/main" id="{AAD12D3A-A4C0-ED74-B29F-DB6B7447D439}"/>
+              </a:ext>
+            </a:extLst>
+          </p:cNvPr>
+          <p:cNvSpPr>
+            <a:spLocks noGrp="1"/>
+          </p:cNvSpPr>
+          <p:nvPr>
+            <p:ph type="title"/>
+          </p:nvPr>
+        </p:nvSpPr>
+        <p:spPr/>
+        <p:txBody>
+          <a:bodyPr/>
+          <a:lstStyle/>
+          <a:p>
+            <a:endParaRPr lang="en-GB"/>
+          </a:p>
+        </p:txBody>
+      </p:sp>
+      <p:sp>
+        <p:nvSpPr>
+          <p:cNvPr id="3" name="Content Placeholder 2">
+            <a:extLst>
+              <a:ext uri="{FF2B5EF4-FFF2-40B4-BE49-F238E27FC236}">
+                <a16:creationId xmlns:a16="http://schemas.microsoft.com/office/drawing/2014/main" id="{886CF5DA-A3A4-AF79-E174-46B2329FF548}"/>
+              </a:ext>
+            </a:extLst>
+          </p:cNvPr>
+          <p:cNvSpPr>
+            <a:spLocks noGrp="1"/>
+          </p:cNvSpPr>
+          <p:nvPr>
+            <p:ph idx="1"/>
+          </p:nvPr>
+        </p:nvSpPr>
+        <p:spPr/>
+        <p:txBody>
+          <a:bodyPr/>
+          <a:lstStyle/>
+          <a:p>
+            <a:endParaRPr lang="en-GB"/>
+          </a:p>
+        </p:txBody>
+      </p:sp>
+      <p:pic>
+        <p:nvPicPr>
+          <p:cNvPr id="5" name="Picture 4">
+            <a:extLst>
+              <a:ext uri="{FF2B5EF4-FFF2-40B4-BE49-F238E27FC236}">
+                <a16:creationId xmlns:a16="http://schemas.microsoft.com/office/drawing/2014/main" id="{F8D42A09-FF7F-1114-3FF2-553B70E9C77A}"/>
+              </a:ext>
+            </a:extLst>
+          </p:cNvPr>
+          <p:cNvPicPr>
+            <a:picLocks noChangeAspect="1"/>
+          </p:cNvPicPr>
+          <p:nvPr/>
+        </p:nvPicPr>
+        <p:blipFill>
+          <a:blip r:embed="rId2"/>
+          <a:stretch>
+            <a:fillRect/>
+          </a:stretch>
+        </p:blipFill>
+        <p:spPr>
+          <a:xfrm>
+            <a:off x="0" y="308924"/>
+            <a:ext cx="12192000" cy="6240151"/>
+          </a:xfrm>
+          <a:prstGeom prst="rect">
+            <a:avLst/>
+          </a:prstGeom>
+        </p:spPr>
+      </p:pic>
+      <p:pic>
+        <p:nvPicPr>
+          <p:cNvPr id="10" name="Picture 9">
+            <a:extLst>
+              <a:ext uri="{FF2B5EF4-FFF2-40B4-BE49-F238E27FC236}">
+                <a16:creationId xmlns:a16="http://schemas.microsoft.com/office/drawing/2014/main" id="{7FF79DD6-D360-D663-209F-59EAE84076ED}"/>
+              </a:ext>
+            </a:extLst>
+          </p:cNvPr>
+          <p:cNvPicPr>
+            <a:picLocks noChangeAspect="1"/>
+          </p:cNvPicPr>
+          <p:nvPr/>
+        </p:nvPicPr>
+        <p:blipFill>
+          <a:blip r:embed="rId3"/>
+          <a:stretch>
+            <a:fillRect/>
+          </a:stretch>
+        </p:blipFill>
+        <p:spPr>
+          <a:xfrm>
+            <a:off x="7698658" y="201481"/>
+            <a:ext cx="4288321" cy="704053"/>
+          </a:xfrm>
+          <a:prstGeom prst="rect">
+            <a:avLst/>
+          </a:prstGeom>
+        </p:spPr>
+      </p:pic>
+    </p:spTree>
+    <p:extLst>
+      <p:ext uri="{BB962C8B-B14F-4D97-AF65-F5344CB8AC3E}">
+        <p14:creationId xmlns:p14="http://schemas.microsoft.com/office/powerpoint/2010/main" val="1939344988"/>
       </p:ext>
     </p:extLst>
   </p:cSld>

</xml_diff>